<commit_message>
La til tweet i presentasjonen. Endret enumerasjonene i each-ene, samt bruker input handlebars-helperen i stedet for Ember.TextField
</commit_message>
<xml_diff>
--- a/EmberJS.pptx
+++ b/EmberJS.pptx
@@ -5,16 +5,17 @@
     <p:sldMasterId id="2147483648" r:id="rId1"/>
   </p:sldMasterIdLst>
   <p:notesMasterIdLst>
-    <p:notesMasterId r:id="rId6"/>
+    <p:notesMasterId r:id="rId7"/>
   </p:notesMasterIdLst>
   <p:handoutMasterIdLst>
-    <p:handoutMasterId r:id="rId7"/>
+    <p:handoutMasterId r:id="rId8"/>
   </p:handoutMasterIdLst>
   <p:sldIdLst>
     <p:sldId id="256" r:id="rId2"/>
     <p:sldId id="257" r:id="rId3"/>
     <p:sldId id="258" r:id="rId4"/>
-    <p:sldId id="259" r:id="rId5"/>
+    <p:sldId id="260" r:id="rId5"/>
+    <p:sldId id="259" r:id="rId6"/>
   </p:sldIdLst>
   <p:sldSz cx="9144000" cy="5143500" type="screen16x9"/>
   <p:notesSz cx="6858000" cy="9144000"/>
@@ -17620,13 +17621,8 @@
           <a:p>
             <a:r>
               <a:rPr lang="nb-NO" dirty="0" smtClean="0"/>
-              <a:t>Konvensjon over </a:t>
-            </a:r>
-            <a:r>
-              <a:rPr lang="nb-NO" dirty="0" smtClean="0"/>
-              <a:t>konfigurasjon (Følg konvensjonene!)</a:t>
-            </a:r>
-            <a:endParaRPr lang="nb-NO" dirty="0" smtClean="0"/>
+              <a:t>Konvensjon over konfigurasjon (Følg konvensjonene!)</a:t>
+            </a:r>
           </a:p>
           <a:p>
             <a:r>
@@ -17637,7 +17633,15 @@
           <a:p>
             <a:r>
               <a:rPr lang="nb-NO" dirty="0" smtClean="0"/>
-              <a:t>rc 7 - 14 august</a:t>
+              <a:t>rc </a:t>
+            </a:r>
+            <a:r>
+              <a:rPr lang="nb-NO" dirty="0" smtClean="0"/>
+              <a:t>8 – 29. </a:t>
+            </a:r>
+            <a:r>
+              <a:rPr lang="nb-NO" dirty="0" smtClean="0"/>
+              <a:t>august</a:t>
             </a:r>
           </a:p>
         </p:txBody>
@@ -17836,6 +17840,141 @@
           <a:bodyPr/>
           <a:lstStyle/>
           <a:p>
+            <a:endParaRPr lang="nb-NO" dirty="0"/>
+          </a:p>
+        </p:txBody>
+      </p:sp>
+      <p:sp>
+        <p:nvSpPr>
+          <p:cNvPr id="3" name="Title 2"/>
+          <p:cNvSpPr>
+            <a:spLocks noGrp="1"/>
+          </p:cNvSpPr>
+          <p:nvPr>
+            <p:ph type="title"/>
+          </p:nvPr>
+        </p:nvSpPr>
+        <p:spPr>
+          <a:xfrm>
+            <a:off x="376445" y="294936"/>
+            <a:ext cx="1658146" cy="261610"/>
+          </a:xfrm>
+        </p:spPr>
+        <p:txBody>
+          <a:bodyPr/>
+          <a:lstStyle/>
+          <a:p>
+            <a:r>
+              <a:rPr lang="nb-NO" dirty="0" smtClean="0"/>
+              <a:t>Versjon 1.0?</a:t>
+            </a:r>
+            <a:endParaRPr lang="nb-NO" dirty="0"/>
+          </a:p>
+        </p:txBody>
+      </p:sp>
+      <p:pic>
+        <p:nvPicPr>
+          <p:cNvPr id="1026" name="Picture 2" descr="C:\Users\lars skjelbek\Desktop\Photo 28.08.13 19 27 36.png"/>
+          <p:cNvPicPr>
+            <a:picLocks noChangeAspect="1" noChangeArrowheads="1"/>
+          </p:cNvPicPr>
+          <p:nvPr/>
+        </p:nvPicPr>
+        <p:blipFill>
+          <a:blip r:embed="rId2">
+            <a:extLst>
+              <a:ext uri="{28A0092B-C50C-407E-A947-70E740481C1C}">
+                <a14:useLocalDpi xmlns:a14="http://schemas.microsoft.com/office/drawing/2010/main" val="0"/>
+              </a:ext>
+            </a:extLst>
+          </a:blip>
+          <a:srcRect/>
+          <a:stretch>
+            <a:fillRect/>
+          </a:stretch>
+        </p:blipFill>
+        <p:spPr bwMode="auto">
+          <a:xfrm>
+            <a:off x="1987333" y="1760804"/>
+            <a:ext cx="5186241" cy="1823644"/>
+          </a:xfrm>
+          <a:prstGeom prst="rect">
+            <a:avLst/>
+          </a:prstGeom>
+          <a:noFill/>
+          <a:effectLst>
+            <a:outerShdw blurRad="266700" dist="50800" dir="5400000" algn="t" rotWithShape="0">
+              <a:prstClr val="black">
+                <a:alpha val="40000"/>
+              </a:prstClr>
+            </a:outerShdw>
+          </a:effectLst>
+          <a:extLst>
+            <a:ext uri="{909E8E84-426E-40DD-AFC4-6F175D3DCCD1}">
+              <a14:hiddenFill xmlns:a14="http://schemas.microsoft.com/office/drawing/2010/main">
+                <a:solidFill>
+                  <a:srgbClr val="FFFFFF"/>
+                </a:solidFill>
+              </a14:hiddenFill>
+            </a:ext>
+          </a:extLst>
+        </p:spPr>
+      </p:pic>
+    </p:spTree>
+    <p:extLst>
+      <p:ext uri="{BB962C8B-B14F-4D97-AF65-F5344CB8AC3E}">
+        <p14:creationId xmlns:p14="http://schemas.microsoft.com/office/powerpoint/2010/main" val="2249244863"/>
+      </p:ext>
+    </p:extLst>
+  </p:cSld>
+  <p:clrMapOvr>
+    <a:masterClrMapping/>
+  </p:clrMapOvr>
+  <p:transition>
+    <p:fade thruBlk="1"/>
+  </p:transition>
+  <p:timing>
+    <p:tnLst>
+      <p:par>
+        <p:cTn id="1" dur="indefinite" restart="never" nodeType="tmRoot"/>
+      </p:par>
+    </p:tnLst>
+  </p:timing>
+</p:sld>
+</file>
+
+<file path=ppt/slides/slide5.xml><?xml version="1.0" encoding="utf-8"?>
+<p:sld xmlns:a="http://schemas.openxmlformats.org/drawingml/2006/main" xmlns:r="http://schemas.openxmlformats.org/officeDocument/2006/relationships" xmlns:p="http://schemas.openxmlformats.org/presentationml/2006/main">
+  <p:cSld>
+    <p:spTree>
+      <p:nvGrpSpPr>
+        <p:cNvPr id="1" name=""/>
+        <p:cNvGrpSpPr/>
+        <p:nvPr/>
+      </p:nvGrpSpPr>
+      <p:grpSpPr>
+        <a:xfrm>
+          <a:off x="0" y="0"/>
+          <a:ext cx="0" cy="0"/>
+          <a:chOff x="0" y="0"/>
+          <a:chExt cx="0" cy="0"/>
+        </a:xfrm>
+      </p:grpSpPr>
+      <p:sp>
+        <p:nvSpPr>
+          <p:cNvPr id="2" name="Content Placeholder 1"/>
+          <p:cNvSpPr>
+            <a:spLocks noGrp="1"/>
+          </p:cNvSpPr>
+          <p:nvPr>
+            <p:ph idx="1"/>
+          </p:nvPr>
+        </p:nvSpPr>
+        <p:spPr/>
+        <p:txBody>
+          <a:bodyPr/>
+          <a:lstStyle/>
+          <a:p>
             <a:r>
               <a:rPr lang="nb-NO" dirty="0" smtClean="0"/>
               <a:t>Github: </a:t>
@@ -17953,7 +18092,6 @@
               <a:rPr lang="nb-NO" sz="8800" dirty="0" smtClean="0"/>
               <a:t>?</a:t>
             </a:r>
-            <a:endParaRPr lang="nb-NO" sz="8800" dirty="0" smtClean="0"/>
           </a:p>
         </p:txBody>
       </p:sp>

</xml_diff>

<commit_message>
Added some small points to PowerPoint and found the align center button so images are 100% perfectly in the middle of the screen
</commit_message>
<xml_diff>
--- a/EmberJS.pptx
+++ b/EmberJS.pptx
@@ -17609,7 +17609,7 @@
           <a:p>
             <a:r>
               <a:rPr lang="nb-NO" dirty="0" smtClean="0"/>
-              <a:t>Født desember 2011</a:t>
+              <a:t>Født desember 2011 (Tom dale &amp; Yehuda Katz)</a:t>
             </a:r>
           </a:p>
           <a:p>
@@ -17621,6 +17621,12 @@
           <a:p>
             <a:r>
               <a:rPr lang="nb-NO" dirty="0" smtClean="0"/>
+              <a:t>URL-drevet	</a:t>
+            </a:r>
+          </a:p>
+          <a:p>
+            <a:r>
+              <a:rPr lang="nb-NO" dirty="0" smtClean="0"/>
               <a:t>Konvensjon over konfigurasjon (Følg konvensjonene!)</a:t>
             </a:r>
           </a:p>
@@ -17633,15 +17639,7 @@
           <a:p>
             <a:r>
               <a:rPr lang="nb-NO" dirty="0" smtClean="0"/>
-              <a:t>rc </a:t>
-            </a:r>
-            <a:r>
-              <a:rPr lang="nb-NO" dirty="0" smtClean="0"/>
-              <a:t>8 – 29. </a:t>
-            </a:r>
-            <a:r>
-              <a:rPr lang="nb-NO" dirty="0" smtClean="0"/>
-              <a:t>august</a:t>
+              <a:t>rc 7 - 14 august</a:t>
             </a:r>
           </a:p>
         </p:txBody>
@@ -17767,7 +17765,7 @@
         </p:blipFill>
         <p:spPr bwMode="auto">
           <a:xfrm>
-            <a:off x="2431619" y="674058"/>
+            <a:off x="2593182" y="674058"/>
             <a:ext cx="3957637" cy="3957637"/>
           </a:xfrm>
           <a:prstGeom prst="rect">
@@ -17923,7 +17921,7 @@
     </p:spTree>
     <p:extLst>
       <p:ext uri="{BB962C8B-B14F-4D97-AF65-F5344CB8AC3E}">
-        <p14:creationId xmlns:p14="http://schemas.microsoft.com/office/powerpoint/2010/main" val="2249244863"/>
+        <p14:creationId xmlns:p14="http://schemas.microsoft.com/office/powerpoint/2010/main" val="2100484714"/>
       </p:ext>
     </p:extLst>
   </p:cSld>
@@ -17983,7 +17981,26 @@
               <a:rPr lang="nb-NO" dirty="0">
                 <a:hlinkClick r:id="rId2"/>
               </a:rPr>
-              <a:t>https://github.com/skjelbek/fagdag</a:t>
+              <a:t>https://</a:t>
+            </a:r>
+            <a:r>
+              <a:rPr lang="nb-NO" dirty="0" smtClean="0">
+                <a:hlinkClick r:id="rId2"/>
+              </a:rPr>
+              <a:t>github.com/skjelbek/fagdag</a:t>
+            </a:r>
+            <a:endParaRPr lang="nb-NO" dirty="0" smtClean="0"/>
+          </a:p>
+          <a:p>
+            <a:r>
+              <a:rPr lang="nb-NO" dirty="0" smtClean="0"/>
+              <a:t>Bonus: ember template bundling </a:t>
+            </a:r>
+            <a:r>
+              <a:rPr lang="nb-NO" dirty="0">
+                <a:hlinkClick r:id="rId3"/>
+              </a:rPr>
+              <a:t>https://github.com/madsny/EmberTemplateBundles</a:t>
             </a:r>
             <a:endParaRPr lang="nb-NO" dirty="0"/>
           </a:p>
@@ -18026,7 +18043,7 @@
           <p:nvPr/>
         </p:nvPicPr>
         <p:blipFill>
-          <a:blip r:embed="rId3">
+          <a:blip r:embed="rId4">
             <a:extLst>
               <a:ext uri="{28A0092B-C50C-407E-A947-70E740481C1C}">
                 <a14:useLocalDpi xmlns:a14="http://schemas.microsoft.com/office/drawing/2010/main" val="0"/>
@@ -18040,8 +18057,8 @@
         </p:blipFill>
         <p:spPr bwMode="auto">
           <a:xfrm>
-            <a:off x="2648104" y="1109993"/>
-            <a:ext cx="3521702" cy="3521702"/>
+            <a:off x="3013863" y="934433"/>
+            <a:ext cx="3116274" cy="3116274"/>
           </a:xfrm>
           <a:prstGeom prst="rect">
             <a:avLst/>
@@ -18066,8 +18083,8 @@
         </p:nvSpPr>
         <p:spPr>
           <a:xfrm>
-            <a:off x="4081885" y="258791"/>
-            <a:ext cx="292608" cy="1446550"/>
+            <a:off x="4279390" y="207586"/>
+            <a:ext cx="292608" cy="1323439"/>
           </a:xfrm>
           <a:prstGeom prst="rect">
             <a:avLst/>
@@ -18089,7 +18106,7 @@
               </a:spcAft>
             </a:pPr>
             <a:r>
-              <a:rPr lang="nb-NO" sz="8800" dirty="0" smtClean="0"/>
+              <a:rPr lang="nb-NO" sz="8000" dirty="0" smtClean="0"/>
               <a:t>?</a:t>
             </a:r>
           </a:p>

</xml_diff>